<commit_message>
started work on gather.Rmd
</commit_message>
<xml_diff>
--- a/module15-gathering-and-spreading/gather.pptx
+++ b/module15-gathering-and-spreading/gather.pptx
@@ -5,12 +5,16 @@
     <p:sldMasterId id="2147483648" r:id="rId1"/>
   </p:sldMasterIdLst>
   <p:notesMasterIdLst>
-    <p:NotesMasterId r:id="rId5"/>
+    <p:NotesMasterId r:id="rId9"/>
   </p:notesMasterIdLst>
   <p:sldIdLst>
     <p:sldId id="256" r:id="rId2"/>
     <p:sldId id="257" r:id="rId3"/>
     <p:sldId id="258" r:id="rId4"/>
+    <p:sldId id="259" r:id="rId5"/>
+    <p:sldId id="260" r:id="rId6"/>
+    <p:sldId id="261" r:id="rId7"/>
+    <p:sldId id="262" r:id="rId8"/>
   </p:sldIdLst>
   <p:sldSz cx="9144000" cy="6858000" type="screen4x3"/>
   <p:notesSz cx="6858000" cy="9144000"/>
@@ -527,7 +531,167 @@
             </a:pPr>
             <a:r>
               <a:rPr/>
-              <a:t>In</a:t>
+              <a:t>This</a:t>
+            </a:r>
+            <a:r>
+              <a:rPr/>
+              <a:t> </a:t>
+            </a:r>
+            <a:r>
+              <a:rPr/>
+              <a:t>data</a:t>
+            </a:r>
+            <a:r>
+              <a:rPr/>
+              <a:t> </a:t>
+            </a:r>
+            <a:r>
+              <a:rPr/>
+              <a:t>set</a:t>
+            </a:r>
+            <a:r>
+              <a:rPr/>
+              <a:t> </a:t>
+            </a:r>
+            <a:r>
+              <a:rPr/>
+              <a:t>displays</a:t>
+            </a:r>
+            <a:r>
+              <a:rPr/>
+              <a:t> </a:t>
+            </a:r>
+            <a:r>
+              <a:rPr/>
+              <a:t>depression</a:t>
+            </a:r>
+            <a:r>
+              <a:rPr/>
+              <a:t> </a:t>
+            </a:r>
+            <a:r>
+              <a:rPr/>
+              <a:t>scores</a:t>
+            </a:r>
+            <a:r>
+              <a:rPr/>
+              <a:t> </a:t>
+            </a:r>
+            <a:r>
+              <a:rPr/>
+              <a:t>among</a:t>
+            </a:r>
+            <a:r>
+              <a:rPr/>
+              <a:t> </a:t>
+            </a:r>
+            <a:r>
+              <a:rPr/>
+              <a:t>college</a:t>
+            </a:r>
+            <a:r>
+              <a:rPr/>
+              <a:t> </a:t>
+            </a:r>
+            <a:r>
+              <a:rPr/>
+              <a:t>students</a:t>
+            </a:r>
+            <a:r>
+              <a:rPr/>
+              <a:t> </a:t>
+            </a:r>
+            <a:r>
+              <a:rPr/>
+              <a:t>in</a:t>
+            </a:r>
+            <a:r>
+              <a:rPr/>
+              <a:t> </a:t>
+            </a:r>
+            <a:r>
+              <a:rPr/>
+              <a:t>a</a:t>
+            </a:r>
+            <a:r>
+              <a:rPr/>
+              <a:t> </a:t>
+            </a:r>
+            <a:r>
+              <a:rPr/>
+              <a:t>study</a:t>
+            </a:r>
+            <a:r>
+              <a:rPr/>
+              <a:t> </a:t>
+            </a:r>
+            <a:r>
+              <a:rPr/>
+              <a:t>planned</a:t>
+            </a:r>
+            <a:r>
+              <a:rPr/>
+              <a:t> </a:t>
+            </a:r>
+            <a:r>
+              <a:rPr/>
+              <a:t>for</a:t>
+            </a:r>
+            <a:r>
+              <a:rPr/>
+              <a:t> </a:t>
+            </a:r>
+            <a:r>
+              <a:rPr/>
+              <a:t>other</a:t>
+            </a:r>
+            <a:r>
+              <a:rPr/>
+              <a:t> </a:t>
+            </a:r>
+            <a:r>
+              <a:rPr/>
+              <a:t>purposes</a:t>
+            </a:r>
+            <a:r>
+              <a:rPr/>
+              <a:t> </a:t>
+            </a:r>
+            <a:r>
+              <a:rPr/>
+              <a:t>but</a:t>
+            </a:r>
+            <a:r>
+              <a:rPr/>
+              <a:t> </a:t>
+            </a:r>
+            <a:r>
+              <a:rPr/>
+              <a:t>which</a:t>
+            </a:r>
+            <a:r>
+              <a:rPr/>
+              <a:t> </a:t>
+            </a:r>
+            <a:r>
+              <a:rPr/>
+              <a:t>ended</a:t>
+            </a:r>
+            <a:r>
+              <a:rPr/>
+              <a:t> </a:t>
+            </a:r>
+            <a:r>
+              <a:rPr/>
+              <a:t>up</a:t>
+            </a:r>
+            <a:r>
+              <a:rPr/>
+              <a:t> </a:t>
+            </a:r>
+            <a:r>
+              <a:rPr/>
+              <a:t>with</a:t>
             </a:r>
             <a:r>
               <a:rPr/>
@@ -543,31 +707,39 @@
             </a:r>
             <a:r>
               <a:rPr/>
-              <a:t>previous</a:t>
-            </a:r>
-            <a:r>
-              <a:rPr/>
-              <a:t> </a:t>
-            </a:r>
-            <a:r>
-              <a:rPr/>
-              <a:t>module,</a:t>
-            </a:r>
-            <a:r>
-              <a:rPr/>
-              <a:t> </a:t>
-            </a:r>
-            <a:r>
-              <a:rPr/>
-              <a:t>I</a:t>
-            </a:r>
-            <a:r>
-              <a:rPr/>
-              <a:t> </a:t>
-            </a:r>
-            <a:r>
-              <a:rPr/>
-              <a:t>mentioned</a:t>
+              <a:t>baseline</a:t>
+            </a:r>
+            <a:r>
+              <a:rPr/>
+              <a:t> </a:t>
+            </a:r>
+            <a:r>
+              <a:rPr/>
+              <a:t>measurements</a:t>
+            </a:r>
+            <a:r>
+              <a:rPr/>
+              <a:t> </a:t>
+            </a:r>
+            <a:r>
+              <a:rPr/>
+              <a:t>collected</a:t>
+            </a:r>
+            <a:r>
+              <a:rPr/>
+              <a:t> </a:t>
+            </a:r>
+            <a:r>
+              <a:rPr/>
+              <a:t>just</a:t>
+            </a:r>
+            <a:r>
+              <a:rPr/>
+              <a:t> </a:t>
+            </a:r>
+            <a:r>
+              <a:rPr/>
+              <a:t>before</a:t>
             </a:r>
             <a:r>
               <a:rPr/>
@@ -583,31 +755,87 @@
             </a:r>
             <a:r>
               <a:rPr/>
-              <a:t>simple</a:t>
-            </a:r>
-            <a:r>
-              <a:rPr/>
-              <a:t> </a:t>
-            </a:r>
-            <a:r>
-              <a:rPr/>
-              <a:t>case:</a:t>
-            </a:r>
-            <a:r>
-              <a:rPr/>
-              <a:t> </a:t>
-            </a:r>
-            <a:r>
-              <a:rPr/>
-              <a:t>every</a:t>
-            </a:r>
-            <a:r>
-              <a:rPr/>
-              <a:t> </a:t>
-            </a:r>
-            <a:r>
-              <a:rPr/>
-              <a:t>label</a:t>
+              <a:t>major</a:t>
+            </a:r>
+            <a:r>
+              <a:rPr/>
+              <a:t> </a:t>
+            </a:r>
+            <a:r>
+              <a:rPr/>
+              <a:t>California</a:t>
+            </a:r>
+            <a:r>
+              <a:rPr/>
+              <a:t> </a:t>
+            </a:r>
+            <a:r>
+              <a:rPr/>
+              <a:t>earthquake.</a:t>
+            </a:r>
+            <a:r>
+              <a:rPr/>
+              <a:t> </a:t>
+            </a:r>
+            <a:r>
+              <a:rPr/>
+              <a:t>The</a:t>
+            </a:r>
+            <a:r>
+              <a:rPr/>
+              <a:t> </a:t>
+            </a:r>
+            <a:r>
+              <a:rPr/>
+              <a:t>researchers</a:t>
+            </a:r>
+            <a:r>
+              <a:rPr/>
+              <a:t> </a:t>
+            </a:r>
+            <a:r>
+              <a:rPr/>
+              <a:t>seized</a:t>
+            </a:r>
+            <a:r>
+              <a:rPr/>
+              <a:t> </a:t>
+            </a:r>
+            <a:r>
+              <a:rPr/>
+              <a:t>the</a:t>
+            </a:r>
+            <a:r>
+              <a:rPr/>
+              <a:t> </a:t>
+            </a:r>
+            <a:r>
+              <a:rPr/>
+              <a:t>opportunity</a:t>
+            </a:r>
+            <a:r>
+              <a:rPr/>
+              <a:t> </a:t>
+            </a:r>
+            <a:r>
+              <a:rPr/>
+              <a:t>to</a:t>
+            </a:r>
+            <a:r>
+              <a:rPr/>
+              <a:t> </a:t>
+            </a:r>
+            <a:r>
+              <a:rPr/>
+              <a:t>assess</a:t>
+            </a:r>
+            <a:r>
+              <a:rPr/>
+              <a:t> </a:t>
+            </a:r>
+            <a:r>
+              <a:rPr/>
+              <a:t>changes</a:t>
             </a:r>
             <a:r>
               <a:rPr/>
@@ -623,6 +851,46 @@
             </a:r>
             <a:r>
               <a:rPr/>
+              <a:t>depression</a:t>
+            </a:r>
+            <a:r>
+              <a:rPr/>
+              <a:t> </a:t>
+            </a:r>
+            <a:r>
+              <a:rPr/>
+              <a:t>immediately</a:t>
+            </a:r>
+            <a:r>
+              <a:rPr/>
+              <a:t> </a:t>
+            </a:r>
+            <a:r>
+              <a:rPr/>
+              <a:t>before</a:t>
+            </a:r>
+            <a:r>
+              <a:rPr/>
+              <a:t> </a:t>
+            </a:r>
+            <a:r>
+              <a:rPr/>
+              <a:t>and</a:t>
+            </a:r>
+            <a:r>
+              <a:rPr/>
+              <a:t> </a:t>
+            </a:r>
+            <a:r>
+              <a:rPr/>
+              <a:t>after</a:t>
+            </a:r>
+            <a:r>
+              <a:rPr/>
+              <a:t> </a:t>
+            </a:r>
+            <a:r>
+              <a:rPr/>
               <a:t>the</a:t>
             </a:r>
             <a:r>
@@ -631,23 +899,313 @@
             </a:r>
             <a:r>
               <a:rPr/>
-              <a:t>small</a:t>
-            </a:r>
-            <a:r>
-              <a:rPr/>
-              <a:t> </a:t>
-            </a:r>
-            <a:r>
-              <a:rPr/>
-              <a:t>table</a:t>
-            </a:r>
-            <a:r>
-              <a:rPr/>
-              <a:t> </a:t>
-            </a:r>
-            <a:r>
-              <a:rPr/>
-              <a:t>has</a:t>
+              <a:t>earchquake</a:t>
+            </a:r>
+            <a:r>
+              <a:rPr/>
+              <a:t> </a:t>
+            </a:r>
+            <a:r>
+              <a:rPr/>
+              <a:t>as</a:t>
+            </a:r>
+            <a:r>
+              <a:rPr/>
+              <a:t> </a:t>
+            </a:r>
+            <a:r>
+              <a:rPr/>
+              <a:t>well</a:t>
+            </a:r>
+            <a:r>
+              <a:rPr/>
+              <a:t> </a:t>
+            </a:r>
+            <a:r>
+              <a:rPr/>
+              <a:t>as</a:t>
+            </a:r>
+            <a:r>
+              <a:rPr/>
+              <a:t> </a:t>
+            </a:r>
+            <a:r>
+              <a:rPr/>
+              <a:t>the</a:t>
+            </a:r>
+            <a:r>
+              <a:rPr/>
+              <a:t> </a:t>
+            </a:r>
+            <a:r>
+              <a:rPr/>
+              <a:t>recovery</a:t>
+            </a:r>
+            <a:r>
+              <a:rPr/>
+              <a:t> </a:t>
+            </a:r>
+            <a:r>
+              <a:rPr/>
+              <a:t>process</a:t>
+            </a:r>
+            <a:r>
+              <a:rPr/>
+              <a:t> </a:t>
+            </a:r>
+            <a:r>
+              <a:rPr/>
+              <a:t>longer</a:t>
+            </a:r>
+            <a:r>
+              <a:rPr/>
+              <a:t> </a:t>
+            </a:r>
+            <a:r>
+              <a:rPr/>
+              <a:t>term.</a:t>
+            </a:r>
+          </a:p>
+        </p:txBody>
+      </p:sp>
+      <p:sp>
+        <p:nvSpPr>
+          <p:cNvPr id="4" name="Slide Number Placeholder 3"/>
+          <p:cNvSpPr>
+            <a:spLocks noGrp="1"/>
+          </p:cNvSpPr>
+          <p:nvPr>
+            <p:ph type="sldNum" sz="quarter" idx="10"/>
+          </p:nvPr>
+        </p:nvSpPr>
+        <p:spPr/>
+        <p:txBody>
+          <a:bodyPr/>
+          <a:lstStyle/>
+          <a:p>
+            <a:fld id="{18BDFEC3-8487-43E8-A154-7C12CBC1FFF2}" type="slidenum">
+              <a:rPr lang="en-US"/>
+              <a:t>2</a:t>
+            </a:fld>
+            <a:endParaRPr lang="en-US"/>
+          </a:p>
+        </p:txBody>
+      </p:sp>
+    </p:spTree>
+  </p:cSld>
+</p:notes>
+</file>
+
+<file path=ppt/notesSlides/notesSlide2.xml><?xml version="1.0" encoding="utf-8"?>
+<p:notes xmlns:a="http://schemas.openxmlformats.org/drawingml/2006/main" xmlns:r="http://schemas.openxmlformats.org/officeDocument/2006/relationships" xmlns:p="http://schemas.openxmlformats.org/presentationml/2006/main">
+  <p:cSld>
+    <p:spTree>
+      <p:nvGrpSpPr>
+        <p:cNvPr id="1" name=""/>
+        <p:cNvGrpSpPr/>
+        <p:nvPr/>
+      </p:nvGrpSpPr>
+      <p:grpSpPr>
+        <a:xfrm>
+          <a:off x="0" y="0"/>
+          <a:ext cx="0" cy="0"/>
+          <a:chOff x="0" y="0"/>
+          <a:chExt cx="0" cy="0"/>
+        </a:xfrm>
+      </p:grpSpPr>
+      <p:sp>
+        <p:nvSpPr>
+          <p:cNvPr id="2" name="Slide Image Placeholder 1"/>
+          <p:cNvSpPr>
+            <a:spLocks noGrp="1" noRot="1" noChangeAspect="1"/>
+          </p:cNvSpPr>
+          <p:nvPr>
+            <p:ph type="sldImg"/>
+          </p:nvPr>
+        </p:nvSpPr>
+        <p:spPr/>
+      </p:sp>
+      <p:sp>
+        <p:nvSpPr>
+          <p:cNvPr id="3" name="Notes Placeholder 2"/>
+          <p:cNvSpPr>
+            <a:spLocks noGrp="1"/>
+          </p:cNvSpPr>
+          <p:nvPr>
+            <p:ph type="body" idx="1"/>
+          </p:nvPr>
+        </p:nvSpPr>
+        <p:spPr/>
+        <p:txBody>
+          <a:bodyPr/>
+          <a:lstStyle/>
+          <a:p>
+            <a:pPr lvl="0" marL="0" indent="0">
+              <a:buNone/>
+            </a:pPr>
+            <a:r>
+              <a:rPr/>
+              <a:t>This</a:t>
+            </a:r>
+            <a:r>
+              <a:rPr/>
+              <a:t> </a:t>
+            </a:r>
+            <a:r>
+              <a:rPr/>
+              <a:t>is</a:t>
+            </a:r>
+            <a:r>
+              <a:rPr/>
+              <a:t> </a:t>
+            </a:r>
+            <a:r>
+              <a:rPr/>
+              <a:t>what</a:t>
+            </a:r>
+            <a:r>
+              <a:rPr/>
+              <a:t> </a:t>
+            </a:r>
+            <a:r>
+              <a:rPr/>
+              <a:t>the</a:t>
+            </a:r>
+            <a:r>
+              <a:rPr/>
+              <a:t> </a:t>
+            </a:r>
+            <a:r>
+              <a:rPr/>
+              <a:t>original</a:t>
+            </a:r>
+            <a:r>
+              <a:rPr/>
+              <a:t> </a:t>
+            </a:r>
+            <a:r>
+              <a:rPr/>
+              <a:t>data</a:t>
+            </a:r>
+            <a:r>
+              <a:rPr/>
+              <a:t> </a:t>
+            </a:r>
+            <a:r>
+              <a:rPr/>
+              <a:t>looks</a:t>
+            </a:r>
+            <a:r>
+              <a:rPr/>
+              <a:t> </a:t>
+            </a:r>
+            <a:r>
+              <a:rPr/>
+              <a:t>like.</a:t>
+            </a:r>
+            <a:r>
+              <a:rPr/>
+              <a:t> </a:t>
+            </a:r>
+            <a:r>
+              <a:rPr/>
+              <a:t>Notice</a:t>
+            </a:r>
+            <a:r>
+              <a:rPr/>
+              <a:t> </a:t>
+            </a:r>
+            <a:r>
+              <a:rPr/>
+              <a:t>that</a:t>
+            </a:r>
+            <a:r>
+              <a:rPr/>
+              <a:t> </a:t>
+            </a:r>
+            <a:r>
+              <a:rPr/>
+              <a:t>there</a:t>
+            </a:r>
+            <a:r>
+              <a:rPr/>
+              <a:t> </a:t>
+            </a:r>
+            <a:r>
+              <a:rPr/>
+              <a:t>is</a:t>
+            </a:r>
+            <a:r>
+              <a:rPr/>
+              <a:t> </a:t>
+            </a:r>
+            <a:r>
+              <a:rPr/>
+              <a:t>no</a:t>
+            </a:r>
+            <a:r>
+              <a:rPr/>
+              <a:t> </a:t>
+            </a:r>
+            <a:r>
+              <a:rPr/>
+              <a:t>primary</a:t>
+            </a:r>
+            <a:r>
+              <a:rPr/>
+              <a:t> </a:t>
+            </a:r>
+            <a:r>
+              <a:rPr/>
+              <a:t>key</a:t>
+            </a:r>
+            <a:r>
+              <a:rPr/>
+              <a:t> </a:t>
+            </a:r>
+            <a:r>
+              <a:rPr/>
+              <a:t>in</a:t>
+            </a:r>
+            <a:r>
+              <a:rPr/>
+              <a:t> </a:t>
+            </a:r>
+            <a:r>
+              <a:rPr/>
+              <a:t>this</a:t>
+            </a:r>
+            <a:r>
+              <a:rPr/>
+              <a:t> </a:t>
+            </a:r>
+            <a:r>
+              <a:rPr/>
+              <a:t>table.</a:t>
+            </a:r>
+            <a:r>
+              <a:rPr/>
+              <a:t> </a:t>
+            </a:r>
+            <a:r>
+              <a:rPr/>
+              <a:t>Normally</a:t>
+            </a:r>
+            <a:r>
+              <a:rPr/>
+              <a:t> </a:t>
+            </a:r>
+            <a:r>
+              <a:rPr/>
+              <a:t>this</a:t>
+            </a:r>
+            <a:r>
+              <a:rPr/>
+              <a:t> </a:t>
+            </a:r>
+            <a:r>
+              <a:rPr/>
+              <a:t>is</a:t>
             </a:r>
             <a:r>
               <a:rPr/>
@@ -663,7 +1221,15 @@
             </a:r>
             <a:r>
               <a:rPr/>
-              <a:t>code</a:t>
+              <a:t>major</a:t>
+            </a:r>
+            <a:r>
+              <a:rPr/>
+              <a:t> </a:t>
+            </a:r>
+            <a:r>
+              <a:rPr/>
+              <a:t>flaw</a:t>
             </a:r>
             <a:r>
               <a:rPr/>
@@ -679,247 +1245,71 @@
             </a:r>
             <a:r>
               <a:rPr/>
-              <a:t>the</a:t>
-            </a:r>
-            <a:r>
-              <a:rPr/>
-              <a:t> </a:t>
-            </a:r>
-            <a:r>
-              <a:rPr/>
-              <a:t>big</a:t>
-            </a:r>
-            <a:r>
-              <a:rPr/>
-              <a:t> </a:t>
-            </a:r>
-            <a:r>
-              <a:rPr/>
-              <a:t>table</a:t>
-            </a:r>
-            <a:r>
-              <a:rPr/>
-              <a:t> </a:t>
-            </a:r>
-            <a:r>
-              <a:rPr/>
-              <a:t>and</a:t>
-            </a:r>
-            <a:r>
-              <a:rPr/>
-              <a:t> </a:t>
-            </a:r>
-            <a:r>
-              <a:rPr/>
-              <a:t>vice</a:t>
-            </a:r>
-            <a:r>
-              <a:rPr/>
-              <a:t> </a:t>
-            </a:r>
-            <a:r>
-              <a:rPr/>
-              <a:t>versa.</a:t>
-            </a:r>
-            <a:r>
-              <a:rPr/>
-              <a:t> </a:t>
-            </a:r>
-            <a:r>
-              <a:rPr/>
-              <a:t>In</a:t>
-            </a:r>
-            <a:r>
-              <a:rPr/>
-              <a:t> </a:t>
-            </a:r>
-            <a:r>
-              <a:rPr/>
-              <a:t>this</a:t>
-            </a:r>
-            <a:r>
-              <a:rPr/>
-              <a:t> </a:t>
-            </a:r>
-            <a:r>
-              <a:rPr/>
-              <a:t>lecture,</a:t>
-            </a:r>
-            <a:r>
-              <a:rPr/>
-              <a:t> </a:t>
-            </a:r>
-            <a:r>
-              <a:rPr/>
-              <a:t>I’ll</a:t>
-            </a:r>
-            <a:r>
-              <a:rPr/>
-              <a:t> </a:t>
-            </a:r>
-            <a:r>
-              <a:rPr/>
-              <a:t>discuss</a:t>
-            </a:r>
-            <a:r>
-              <a:rPr/>
-              <a:t> </a:t>
-            </a:r>
-            <a:r>
-              <a:rPr/>
-              <a:t>cases</a:t>
-            </a:r>
-            <a:r>
-              <a:rPr/>
-              <a:t> </a:t>
-            </a:r>
-            <a:r>
-              <a:rPr/>
-              <a:t>where</a:t>
-            </a:r>
-            <a:r>
-              <a:rPr/>
-              <a:t> </a:t>
-            </a:r>
-            <a:r>
-              <a:rPr/>
-              <a:t>you</a:t>
-            </a:r>
-            <a:r>
-              <a:rPr/>
-              <a:t> </a:t>
-            </a:r>
-            <a:r>
-              <a:rPr/>
-              <a:t>have</a:t>
-            </a:r>
-            <a:r>
-              <a:rPr/>
-              <a:t> </a:t>
-            </a:r>
-            <a:r>
-              <a:rPr/>
-              <a:t>mismatches.</a:t>
-            </a:r>
-            <a:r>
-              <a:rPr/>
-              <a:t> </a:t>
-            </a:r>
-            <a:r>
-              <a:rPr/>
-              <a:t>Before</a:t>
-            </a:r>
-            <a:r>
-              <a:rPr/>
-              <a:t> </a:t>
-            </a:r>
-            <a:r>
-              <a:rPr/>
-              <a:t>I</a:t>
-            </a:r>
-            <a:r>
-              <a:rPr/>
-              <a:t> </a:t>
-            </a:r>
-            <a:r>
-              <a:rPr/>
-              <a:t>do</a:t>
-            </a:r>
-            <a:r>
-              <a:rPr/>
-              <a:t> </a:t>
-            </a:r>
-            <a:r>
-              <a:rPr/>
-              <a:t>that,</a:t>
-            </a:r>
-            <a:r>
-              <a:rPr/>
-              <a:t> </a:t>
-            </a:r>
-            <a:r>
-              <a:rPr/>
-              <a:t>let</a:t>
-            </a:r>
-            <a:r>
-              <a:rPr/>
-              <a:t> </a:t>
-            </a:r>
-            <a:r>
-              <a:rPr/>
-              <a:t>me</a:t>
-            </a:r>
-            <a:r>
-              <a:rPr/>
-              <a:t> </a:t>
-            </a:r>
-            <a:r>
-              <a:rPr/>
-              <a:t>talk</a:t>
-            </a:r>
-            <a:r>
-              <a:rPr/>
-              <a:t> </a:t>
-            </a:r>
-            <a:r>
-              <a:rPr/>
-              <a:t>briefly</a:t>
-            </a:r>
-            <a:r>
-              <a:rPr/>
-              <a:t> </a:t>
-            </a:r>
-            <a:r>
-              <a:rPr/>
-              <a:t>about</a:t>
-            </a:r>
-            <a:r>
-              <a:rPr/>
-              <a:t> </a:t>
-            </a:r>
-            <a:r>
-              <a:rPr/>
-              <a:t>the</a:t>
-            </a:r>
-            <a:r>
-              <a:rPr/>
-              <a:t> </a:t>
-            </a:r>
-            <a:r>
-              <a:rPr/>
-              <a:t>four</a:t>
-            </a:r>
-            <a:r>
-              <a:rPr/>
-              <a:t> </a:t>
-            </a:r>
-            <a:r>
-              <a:rPr/>
-              <a:t>major</a:t>
-            </a:r>
-            <a:r>
-              <a:rPr/>
-              <a:t> </a:t>
-            </a:r>
-            <a:r>
-              <a:rPr/>
-              <a:t>types</a:t>
-            </a:r>
-            <a:r>
-              <a:rPr/>
-              <a:t> </a:t>
-            </a:r>
-            <a:r>
-              <a:rPr/>
-              <a:t>of</a:t>
-            </a:r>
-            <a:r>
-              <a:rPr/>
-              <a:t> </a:t>
-            </a:r>
-            <a:r>
-              <a:rPr/>
-              <a:t>joins.</a:t>
+              <a:t>any</a:t>
+            </a:r>
+            <a:r>
+              <a:rPr/>
+              <a:t> </a:t>
+            </a:r>
+            <a:r>
+              <a:rPr/>
+              <a:t>reasonable</a:t>
+            </a:r>
+            <a:r>
+              <a:rPr/>
+              <a:t> </a:t>
+            </a:r>
+            <a:r>
+              <a:rPr/>
+              <a:t>database,</a:t>
+            </a:r>
+            <a:r>
+              <a:rPr/>
+              <a:t> </a:t>
+            </a:r>
+            <a:r>
+              <a:rPr/>
+              <a:t>but</a:t>
+            </a:r>
+            <a:r>
+              <a:rPr/>
+              <a:t> </a:t>
+            </a:r>
+            <a:r>
+              <a:rPr/>
+              <a:t>let’s</a:t>
+            </a:r>
+            <a:r>
+              <a:rPr/>
+              <a:t> </a:t>
+            </a:r>
+            <a:r>
+              <a:rPr/>
+              <a:t>ignore</a:t>
+            </a:r>
+            <a:r>
+              <a:rPr/>
+              <a:t> </a:t>
+            </a:r>
+            <a:r>
+              <a:rPr/>
+              <a:t>that</a:t>
+            </a:r>
+            <a:r>
+              <a:rPr/>
+              <a:t> </a:t>
+            </a:r>
+            <a:r>
+              <a:rPr/>
+              <a:t>for</a:t>
+            </a:r>
+            <a:r>
+              <a:rPr/>
+              <a:t> </a:t>
+            </a:r>
+            <a:r>
+              <a:rPr/>
+              <a:t>now.</a:t>
             </a:r>
           </a:p>
         </p:txBody>
@@ -942,6 +1332,248 @@
             <a:fld id="{18BDFEC3-8487-43E8-A154-7C12CBC1FFF2}" type="slidenum">
               <a:rPr lang="en-US"/>
               <a:t>3</a:t>
+            </a:fld>
+            <a:endParaRPr lang="en-US"/>
+          </a:p>
+        </p:txBody>
+      </p:sp>
+    </p:spTree>
+  </p:cSld>
+</p:notes>
+</file>
+
+<file path=ppt/notesSlides/notesSlide3.xml><?xml version="1.0" encoding="utf-8"?>
+<p:notes xmlns:a="http://schemas.openxmlformats.org/drawingml/2006/main" xmlns:r="http://schemas.openxmlformats.org/officeDocument/2006/relationships" xmlns:p="http://schemas.openxmlformats.org/presentationml/2006/main">
+  <p:cSld>
+    <p:spTree>
+      <p:nvGrpSpPr>
+        <p:cNvPr id="1" name=""/>
+        <p:cNvGrpSpPr/>
+        <p:nvPr/>
+      </p:nvGrpSpPr>
+      <p:grpSpPr>
+        <a:xfrm>
+          <a:off x="0" y="0"/>
+          <a:ext cx="0" cy="0"/>
+          <a:chOff x="0" y="0"/>
+          <a:chExt cx="0" cy="0"/>
+        </a:xfrm>
+      </p:grpSpPr>
+      <p:sp>
+        <p:nvSpPr>
+          <p:cNvPr id="2" name="Slide Image Placeholder 1"/>
+          <p:cNvSpPr>
+            <a:spLocks noGrp="1" noRot="1" noChangeAspect="1"/>
+          </p:cNvSpPr>
+          <p:nvPr>
+            <p:ph type="sldImg"/>
+          </p:nvPr>
+        </p:nvSpPr>
+        <p:spPr/>
+      </p:sp>
+      <p:sp>
+        <p:nvSpPr>
+          <p:cNvPr id="3" name="Notes Placeholder 2"/>
+          <p:cNvSpPr>
+            <a:spLocks noGrp="1"/>
+          </p:cNvSpPr>
+          <p:nvPr>
+            <p:ph type="body" idx="1"/>
+          </p:nvPr>
+        </p:nvSpPr>
+        <p:spPr/>
+        <p:txBody>
+          <a:bodyPr/>
+          <a:lstStyle/>
+          <a:p>
+            <a:pPr lvl="0" marL="0" indent="0">
+              <a:buNone/>
+            </a:pPr>
+            <a:r>
+              <a:rPr/>
+              <a:t>Here</a:t>
+            </a:r>
+            <a:r>
+              <a:rPr/>
+              <a:t> </a:t>
+            </a:r>
+            <a:r>
+              <a:rPr/>
+              <a:t>is</a:t>
+            </a:r>
+            <a:r>
+              <a:rPr/>
+              <a:t> </a:t>
+            </a:r>
+            <a:r>
+              <a:rPr/>
+              <a:t>the</a:t>
+            </a:r>
+            <a:r>
+              <a:rPr/>
+              <a:t> </a:t>
+            </a:r>
+            <a:r>
+              <a:rPr/>
+              <a:t>data</a:t>
+            </a:r>
+            <a:r>
+              <a:rPr/>
+              <a:t> </a:t>
+            </a:r>
+            <a:r>
+              <a:rPr/>
+              <a:t>table</a:t>
+            </a:r>
+            <a:r>
+              <a:rPr/>
+              <a:t> </a:t>
+            </a:r>
+            <a:r>
+              <a:rPr/>
+              <a:t>with</a:t>
+            </a:r>
+            <a:r>
+              <a:rPr/>
+              <a:t> </a:t>
+            </a:r>
+            <a:r>
+              <a:rPr/>
+              <a:t>a</a:t>
+            </a:r>
+            <a:r>
+              <a:rPr/>
+              <a:t> </a:t>
+            </a:r>
+            <a:r>
+              <a:rPr/>
+              <a:t>primary</a:t>
+            </a:r>
+            <a:r>
+              <a:rPr/>
+              <a:t> </a:t>
+            </a:r>
+            <a:r>
+              <a:rPr/>
+              <a:t>key</a:t>
+            </a:r>
+            <a:r>
+              <a:rPr/>
+              <a:t> </a:t>
+            </a:r>
+            <a:r>
+              <a:rPr/>
+              <a:t>added.</a:t>
+            </a:r>
+            <a:r>
+              <a:rPr/>
+              <a:t> </a:t>
+            </a:r>
+            <a:r>
+              <a:rPr/>
+              <a:t>You</a:t>
+            </a:r>
+            <a:r>
+              <a:rPr/>
+              <a:t> </a:t>
+            </a:r>
+            <a:r>
+              <a:rPr/>
+              <a:t>will</a:t>
+            </a:r>
+            <a:r>
+              <a:rPr/>
+              <a:t> </a:t>
+            </a:r>
+            <a:r>
+              <a:rPr/>
+              <a:t>need</a:t>
+            </a:r>
+            <a:r>
+              <a:rPr/>
+              <a:t> </a:t>
+            </a:r>
+            <a:r>
+              <a:rPr/>
+              <a:t>this</a:t>
+            </a:r>
+            <a:r>
+              <a:rPr/>
+              <a:t> </a:t>
+            </a:r>
+            <a:r>
+              <a:rPr/>
+              <a:t>before</a:t>
+            </a:r>
+            <a:r>
+              <a:rPr/>
+              <a:t> </a:t>
+            </a:r>
+            <a:r>
+              <a:rPr/>
+              <a:t>you</a:t>
+            </a:r>
+            <a:r>
+              <a:rPr/>
+              <a:t> </a:t>
+            </a:r>
+            <a:r>
+              <a:rPr/>
+              <a:t>try</a:t>
+            </a:r>
+            <a:r>
+              <a:rPr/>
+              <a:t> </a:t>
+            </a:r>
+            <a:r>
+              <a:rPr/>
+              <a:t>to</a:t>
+            </a:r>
+            <a:r>
+              <a:rPr/>
+              <a:t> </a:t>
+            </a:r>
+            <a:r>
+              <a:rPr/>
+              <a:t>restructure</a:t>
+            </a:r>
+            <a:r>
+              <a:rPr/>
+              <a:t> </a:t>
+            </a:r>
+            <a:r>
+              <a:rPr/>
+              <a:t>your</a:t>
+            </a:r>
+            <a:r>
+              <a:rPr/>
+              <a:t> </a:t>
+            </a:r>
+            <a:r>
+              <a:rPr/>
+              <a:t>data.</a:t>
+            </a:r>
+          </a:p>
+        </p:txBody>
+      </p:sp>
+      <p:sp>
+        <p:nvSpPr>
+          <p:cNvPr id="4" name="Slide Number Placeholder 3"/>
+          <p:cNvSpPr>
+            <a:spLocks noGrp="1"/>
+          </p:cNvSpPr>
+          <p:nvPr>
+            <p:ph type="sldNum" sz="quarter" idx="10"/>
+          </p:nvPr>
+        </p:nvSpPr>
+        <p:spPr/>
+        <p:txBody>
+          <a:bodyPr/>
+          <a:lstStyle/>
+          <a:p>
+            <a:fld id="{18BDFEC3-8487-43E8-A154-7C12CBC1FFF2}" type="slidenum">
+              <a:rPr lang="en-US"/>
+              <a:t>4</a:t>
             </a:fld>
             <a:endParaRPr lang="en-US"/>
           </a:p>
@@ -4141,15 +4773,7 @@
             </a:pPr>
             <a:r>
               <a:rPr/>
-              <a:t>lomaprie_db,</a:t>
-            </a:r>
-            <a:r>
-              <a:rPr/>
-              <a:t> </a:t>
-            </a:r>
-            <a:r>
-              <a:rPr/>
-              <a:t>listing</a:t>
+              <a:t>Description</a:t>
             </a:r>
             <a:r>
               <a:rPr/>
@@ -4165,75 +4789,99 @@
             </a:r>
             <a:r>
               <a:rPr/>
-              <a:t>original</a:t>
-            </a:r>
-            <a:r>
-              <a:rPr/>
-              <a:t> </a:t>
-            </a:r>
-            <a:r>
-              <a:rPr/>
-              <a:t>table</a:t>
-            </a:r>
-          </a:p>
-        </p:txBody>
-      </p:sp>
-      <p:sp>
-        <p:nvSpPr>
-          <p:cNvPr id="3" name="Content Placeholder 2"/>
-          <p:cNvSpPr>
-            <a:spLocks noGrp="1"/>
-          </p:cNvSpPr>
-          <p:nvPr>
-            <p:ph idx="1"/>
-          </p:nvPr>
-        </p:nvSpPr>
-        <p:spPr/>
-        <p:txBody>
-          <a:bodyPr/>
-          <a:lstStyle/>
-          <a:p>
-            <a:pPr lvl="1"/>
-            <a:r>
-              <a:rPr/>
-              <a:t>SQL code</a:t>
-            </a:r>
-          </a:p>
-          <a:p>
-            <a:pPr lvl="0" marL="1270000" indent="0">
+              <a:t>lomaprie</a:t>
+            </a:r>
+            <a:r>
+              <a:rPr/>
+              <a:t> </a:t>
+            </a:r>
+            <a:r>
+              <a:rPr/>
+              <a:t>data</a:t>
+            </a:r>
+            <a:r>
+              <a:rPr/>
+              <a:t> </a:t>
+            </a:r>
+            <a:r>
+              <a:rPr/>
+              <a:t>set</a:t>
+            </a:r>
+          </a:p>
+        </p:txBody>
+      </p:sp>
+      <p:pic>
+        <p:nvPicPr>
+          <p:cNvPr descr="../images/lomaprie.png" id="0" name="Picture 1"/>
+          <p:cNvPicPr>
+            <a:picLocks noGrp="1" noChangeAspect="1"/>
+          </p:cNvPicPr>
+          <p:nvPr/>
+        </p:nvPicPr>
+        <p:blipFill>
+          <a:blip r:embed="rId3"/>
+          <a:stretch>
+            <a:fillRect/>
+          </a:stretch>
+        </p:blipFill>
+        <p:spPr bwMode="auto">
+          <a:xfrm>
+            <a:off x="2222500" y="1600200"/>
+            <a:ext cx="4699000" cy="4013200"/>
+          </a:xfrm>
+          <a:prstGeom prst="rect">
+            <a:avLst/>
+          </a:prstGeom>
+          <a:noFill/>
+          <a:ln w="9525">
+            <a:noFill/>
+            <a:headEnd/>
+            <a:tailEnd/>
+          </a:ln>
+        </p:spPr>
+      </p:pic>
+      <p:sp>
+        <p:nvSpPr>
+          <p:cNvPr id="1" name="TextBox 3"/>
+          <p:cNvSpPr txBox="1"/>
+          <p:nvPr/>
+        </p:nvSpPr>
+        <p:spPr>
+          <a:xfrm>
+            <a:off x="457200" y="5613400"/>
+            <a:ext cx="8229600" cy="508000"/>
+          </a:xfrm>
+          <a:prstGeom prst="rect">
+            <a:avLst/>
+          </a:prstGeom>
+          <a:noFill/>
+        </p:spPr>
+        <p:txBody>
+          <a:bodyPr/>
+          <a:lstStyle/>
+          <a:p>
+            <a:pPr lvl="0" marL="0" indent="0" algn="ctr">
               <a:buNone/>
             </a:pPr>
             <a:r>
-              <a:rPr sz="1800">
-                <a:latin typeface="Courier"/>
-              </a:rPr>
-              <a:t>select row_number() over (order by week0) as id, 
-  week0, week3, week6, week9, week12 
-  from earthquake_table
-  limit 5</a:t>
-            </a:r>
-          </a:p>
-          <a:p>
-            <a:pPr lvl="1"/>
-            <a:r>
-              <a:rPr/>
-              <a:t>Output</a:t>
-            </a:r>
-          </a:p>
-          <a:p>
-            <a:pPr lvl="0" marL="1270000" indent="0">
-              <a:buNone/>
-            </a:pPr>
-            <a:r>
-              <a:rPr sz="1800">
-                <a:latin typeface="Courier"/>
-              </a:rPr>
-              <a:t>##   id Week0 Week3 Week6 Week9 Week12
-## 1  1     2     4     8     5      6
-## 2  2     2     4     8     5      6
-## 3  3     2     9    11     8      8
-## 4  4     4     5     8    10      7
-## 5  5     4     7     9     7     12</a:t>
+              <a:rPr/>
+              <a:t>Description</a:t>
+            </a:r>
+            <a:r>
+              <a:rPr/>
+              <a:t> </a:t>
+            </a:r>
+            <a:r>
+              <a:rPr/>
+              <a:t>of</a:t>
+            </a:r>
+            <a:r>
+              <a:rPr/>
+              <a:t> </a:t>
+            </a:r>
+            <a:r>
+              <a:rPr/>
+              <a:t>data</a:t>
             </a:r>
           </a:p>
         </p:txBody>
@@ -4280,31 +4928,39 @@
             </a:pPr>
             <a:r>
               <a:rPr/>
-              <a:t>How</a:t>
-            </a:r>
-            <a:r>
-              <a:rPr/>
-              <a:t> </a:t>
-            </a:r>
-            <a:r>
-              <a:rPr/>
-              <a:t>to</a:t>
-            </a:r>
-            <a:r>
-              <a:rPr/>
-              <a:t> </a:t>
-            </a:r>
-            <a:r>
-              <a:rPr/>
-              <a:t>handle</a:t>
-            </a:r>
-            <a:r>
-              <a:rPr/>
-              <a:t> </a:t>
-            </a:r>
-            <a:r>
-              <a:rPr/>
-              <a:t>mismatches</a:t>
+              <a:t>lomaprie_db,</a:t>
+            </a:r>
+            <a:r>
+              <a:rPr/>
+              <a:t> </a:t>
+            </a:r>
+            <a:r>
+              <a:rPr/>
+              <a:t>listing</a:t>
+            </a:r>
+            <a:r>
+              <a:rPr/>
+              <a:t> </a:t>
+            </a:r>
+            <a:r>
+              <a:rPr/>
+              <a:t>of</a:t>
+            </a:r>
+            <a:r>
+              <a:rPr/>
+              <a:t> </a:t>
+            </a:r>
+            <a:r>
+              <a:rPr/>
+              <a:t>original</a:t>
+            </a:r>
+            <a:r>
+              <a:rPr/>
+              <a:t> </a:t>
+            </a:r>
+            <a:r>
+              <a:rPr/>
+              <a:t>table</a:t>
             </a:r>
           </a:p>
         </p:txBody>
@@ -4327,28 +4983,473 @@
             <a:pPr lvl="1"/>
             <a:r>
               <a:rPr/>
-              <a:t>Quick overview of the four types of joins</a:t>
+              <a:t>SQL code</a:t>
+            </a:r>
+          </a:p>
+          <a:p>
+            <a:pPr lvl="0" marL="1270000" indent="0">
+              <a:buNone/>
+            </a:pPr>
+            <a:r>
+              <a:rPr sz="1800">
+                <a:latin typeface="Courier"/>
+              </a:rPr>
+              <a:t>select *
+  from earthquake_table
+  limit 5</a:t>
             </a:r>
           </a:p>
           <a:p>
             <a:pPr lvl="1"/>
             <a:r>
               <a:rPr/>
-              <a:t>Two specific cases</a:t>
+              <a:t>Output</a:t>
+            </a:r>
+          </a:p>
+          <a:p>
+            <a:pPr lvl="0" marL="1270000" indent="0">
+              <a:buNone/>
+            </a:pPr>
+            <a:r>
+              <a:rPr sz="1800">
+                <a:latin typeface="Courier"/>
+              </a:rPr>
+              <a:t>##   Week0 Week3 Week6 Week9 Week12
+## 1     6    10     8     4      6
+## 2     2     4     8     5      6
+## 3     2     4     8     5      6
+## 4     4     5     8    10      7
+## 5     4     7     9     7     12</a:t>
+            </a:r>
+          </a:p>
+        </p:txBody>
+      </p:sp>
+    </p:spTree>
+  </p:cSld>
+</p:sld>
+</file>
+
+<file path=ppt/slides/slide4.xml><?xml version="1.0" encoding="utf-8"?>
+<p:sld xmlns:a="http://schemas.openxmlformats.org/drawingml/2006/main" xmlns:r="http://schemas.openxmlformats.org/officeDocument/2006/relationships" xmlns:p="http://schemas.openxmlformats.org/presentationml/2006/main">
+  <p:cSld>
+    <p:spTree>
+      <p:nvGrpSpPr>
+        <p:cNvPr id="1" name=""/>
+        <p:cNvGrpSpPr/>
+        <p:nvPr/>
+      </p:nvGrpSpPr>
+      <p:grpSpPr>
+        <a:xfrm>
+          <a:off x="0" y="0"/>
+          <a:ext cx="0" cy="0"/>
+          <a:chOff x="0" y="0"/>
+          <a:chExt cx="0" cy="0"/>
+        </a:xfrm>
+      </p:grpSpPr>
+      <p:sp>
+        <p:nvSpPr>
+          <p:cNvPr id="2" name="Title 1"/>
+          <p:cNvSpPr>
+            <a:spLocks noGrp="1"/>
+          </p:cNvSpPr>
+          <p:nvPr>
+            <p:ph type="title"/>
+          </p:nvPr>
+        </p:nvSpPr>
+        <p:spPr/>
+        <p:txBody>
+          <a:bodyPr/>
+          <a:lstStyle/>
+          <a:p>
+            <a:pPr lvl="0" marL="0" indent="0">
+              <a:buNone/>
+            </a:pPr>
+            <a:r>
+              <a:rPr/>
+              <a:t>Adding</a:t>
+            </a:r>
+            <a:r>
+              <a:rPr/>
+              <a:t> </a:t>
+            </a:r>
+            <a:r>
+              <a:rPr/>
+              <a:t>a</a:t>
+            </a:r>
+            <a:r>
+              <a:rPr/>
+              <a:t> </a:t>
+            </a:r>
+            <a:r>
+              <a:rPr/>
+              <a:t>primary</a:t>
+            </a:r>
+            <a:r>
+              <a:rPr/>
+              <a:t> </a:t>
+            </a:r>
+            <a:r>
+              <a:rPr/>
+              <a:t>key</a:t>
+            </a:r>
+          </a:p>
+        </p:txBody>
+      </p:sp>
+      <p:sp>
+        <p:nvSpPr>
+          <p:cNvPr id="3" name="Content Placeholder 2"/>
+          <p:cNvSpPr>
+            <a:spLocks noGrp="1"/>
+          </p:cNvSpPr>
+          <p:nvPr>
+            <p:ph idx="1"/>
+          </p:nvPr>
+        </p:nvSpPr>
+        <p:spPr/>
+        <p:txBody>
+          <a:bodyPr/>
+          <a:lstStyle/>
+          <a:p>
+            <a:pPr lvl="1"/>
+            <a:r>
+              <a:rPr/>
+              <a:t>SQL code</a:t>
+            </a:r>
+          </a:p>
+          <a:p>
+            <a:pPr lvl="0" marL="1270000" indent="0">
+              <a:buNone/>
+            </a:pPr>
+            <a:r>
+              <a:rPr sz="1800">
+                <a:latin typeface="Courier"/>
+              </a:rPr>
+              <a:t>select row_number() over (order by week0) as id, 
+  week0, week3, week6, week9, week12 
+  from earthquake_table
+  limit 5</a:t>
+            </a:r>
+          </a:p>
+          <a:p>
+            <a:pPr lvl="1"/>
+            <a:r>
+              <a:rPr/>
+              <a:t>Output</a:t>
+            </a:r>
+          </a:p>
+          <a:p>
+            <a:pPr lvl="0" marL="1270000" indent="0">
+              <a:buNone/>
+            </a:pPr>
+            <a:r>
+              <a:rPr sz="1800">
+                <a:latin typeface="Courier"/>
+              </a:rPr>
+              <a:t>##   id Week0 Week3 Week6 Week9 Week12
+## 1  1     2     4     8     5      6
+## 2  2     2     4     8     5      6
+## 3  3     2     9    11     8      8
+## 4  4     4     5     8    10      7
+## 5  5     4     7     9     7     12</a:t>
+            </a:r>
+          </a:p>
+        </p:txBody>
+      </p:sp>
+    </p:spTree>
+  </p:cSld>
+</p:sld>
+</file>
+
+<file path=ppt/slides/slide5.xml><?xml version="1.0" encoding="utf-8"?>
+<p:sld xmlns:a="http://schemas.openxmlformats.org/drawingml/2006/main" xmlns:r="http://schemas.openxmlformats.org/officeDocument/2006/relationships" xmlns:p="http://schemas.openxmlformats.org/presentationml/2006/main">
+  <p:cSld>
+    <p:spTree>
+      <p:nvGrpSpPr>
+        <p:cNvPr id="1" name=""/>
+        <p:cNvGrpSpPr/>
+        <p:nvPr/>
+      </p:nvGrpSpPr>
+      <p:grpSpPr>
+        <a:xfrm>
+          <a:off x="0" y="0"/>
+          <a:ext cx="0" cy="0"/>
+          <a:chOff x="0" y="0"/>
+          <a:chExt cx="0" cy="0"/>
+        </a:xfrm>
+      </p:grpSpPr>
+      <p:sp>
+        <p:nvSpPr>
+          <p:cNvPr id="2" name="Title 1"/>
+          <p:cNvSpPr>
+            <a:spLocks noGrp="1"/>
+          </p:cNvSpPr>
+          <p:nvPr>
+            <p:ph type="title"/>
+          </p:nvPr>
+        </p:nvSpPr>
+        <p:spPr/>
+        <p:txBody>
+          <a:bodyPr/>
+          <a:lstStyle/>
+          <a:p>
+            <a:pPr lvl="0" marL="0" indent="0">
+              <a:buNone/>
+            </a:pPr>
+            <a:r>
+              <a:rPr/>
+              <a:t>What</a:t>
+            </a:r>
+            <a:r>
+              <a:rPr/>
+              <a:t> </a:t>
+            </a:r>
+            <a:r>
+              <a:rPr/>
+              <a:t>is</a:t>
+            </a:r>
+            <a:r>
+              <a:rPr/>
+              <a:t> </a:t>
+            </a:r>
+            <a:r>
+              <a:rPr/>
+              <a:t>this</a:t>
+            </a:r>
+            <a:r>
+              <a:rPr/>
+              <a:t> </a:t>
+            </a:r>
+            <a:r>
+              <a:rPr/>
+              <a:t>row_number</a:t>
+            </a:r>
+            <a:r>
+              <a:rPr/>
+              <a:t> </a:t>
+            </a:r>
+            <a:r>
+              <a:rPr/>
+              <a:t>function</a:t>
+            </a:r>
+          </a:p>
+        </p:txBody>
+      </p:sp>
+      <p:sp>
+        <p:nvSpPr>
+          <p:cNvPr id="3" name="Content Placeholder 2"/>
+          <p:cNvSpPr>
+            <a:spLocks noGrp="1"/>
+          </p:cNvSpPr>
+          <p:nvPr>
+            <p:ph idx="1"/>
+          </p:nvPr>
+        </p:nvSpPr>
+        <p:spPr/>
+        <p:txBody>
+          <a:bodyPr/>
+          <a:lstStyle/>
+          <a:p>
+            <a:pPr lvl="1"/>
+            <a:r>
+              <a:rPr/>
+              <a:t>Windowing function</a:t>
             </a:r>
           </a:p>
           <a:p>
             <a:pPr lvl="2"/>
             <a:r>
               <a:rPr/>
-              <a:t>Labels in small table without matching codes in big table</a:t>
-            </a:r>
-          </a:p>
-          <a:p>
-            <a:pPr lvl="2"/>
-            <a:r>
-              <a:rPr/>
-              <a:t>Codes in big table without matching label in small table</a:t>
+              <a:t>Not a single row function</a:t>
+            </a:r>
+          </a:p>
+          <a:p>
+            <a:pPr lvl="1"/>
+            <a:r>
+              <a:rPr/>
+              <a:t>Adds a sequence number</a:t>
+            </a:r>
+          </a:p>
+          <a:p>
+            <a:pPr lvl="1"/>
+            <a:r>
+              <a:rPr/>
+              <a:t>Require an over keyword.</a:t>
+            </a:r>
+          </a:p>
+        </p:txBody>
+      </p:sp>
+    </p:spTree>
+  </p:cSld>
+</p:sld>
+</file>
+
+<file path=ppt/slides/slide6.xml><?xml version="1.0" encoding="utf-8"?>
+<p:sld xmlns:a="http://schemas.openxmlformats.org/drawingml/2006/main" xmlns:r="http://schemas.openxmlformats.org/officeDocument/2006/relationships" xmlns:p="http://schemas.openxmlformats.org/presentationml/2006/main">
+  <p:cSld>
+    <p:spTree>
+      <p:nvGrpSpPr>
+        <p:cNvPr id="1" name=""/>
+        <p:cNvGrpSpPr/>
+        <p:nvPr/>
+      </p:nvGrpSpPr>
+      <p:grpSpPr>
+        <a:xfrm>
+          <a:off x="0" y="0"/>
+          <a:ext cx="0" cy="0"/>
+          <a:chOff x="0" y="0"/>
+          <a:chExt cx="0" cy="0"/>
+        </a:xfrm>
+      </p:grpSpPr>
+      <p:sp>
+        <p:nvSpPr>
+          <p:cNvPr id="2" name="Title 1"/>
+          <p:cNvSpPr>
+            <a:spLocks noGrp="1"/>
+          </p:cNvSpPr>
+          <p:nvPr>
+            <p:ph type="title"/>
+          </p:nvPr>
+        </p:nvSpPr>
+        <p:spPr/>
+        <p:txBody>
+          <a:bodyPr/>
+          <a:lstStyle/>
+          <a:p>
+            <a:pPr lvl="0" marL="0" indent="0">
+              <a:buNone/>
+            </a:pPr>
+            <a:r>
+              <a:rPr/>
+              <a:t>Restructuring</a:t>
+            </a:r>
+          </a:p>
+        </p:txBody>
+      </p:sp>
+      <p:sp>
+        <p:nvSpPr>
+          <p:cNvPr id="3" name="Content Placeholder 2"/>
+          <p:cNvSpPr>
+            <a:spLocks noGrp="1"/>
+          </p:cNvSpPr>
+          <p:nvPr>
+            <p:ph idx="1"/>
+          </p:nvPr>
+        </p:nvSpPr>
+        <p:spPr/>
+        <p:txBody>
+          <a:bodyPr/>
+          <a:lstStyle/>
+          <a:p>
+            <a:pPr lvl="1"/>
+            <a:r>
+              <a:rPr/>
+              <a:t>SQL code</a:t>
+            </a:r>
+          </a:p>
+          <a:p>
+            <a:pPr lvl="0" marL="1270000" indent="0">
+              <a:buNone/>
+            </a:pPr>
+            <a:r>
+              <a:rPr sz="1800">
+                <a:latin typeface="Courier"/>
+              </a:rPr>
+              <a:t>select row_number() over (order by week0) as id, 
+  week0 as depression_score,
+  0 as time
+  from earthquake_table
+  union
+    select row_number() over (order by week0) as id,
+    week3 as depression_score,
+    3 as time
+    from earthquake_table
+  limit 5</a:t>
+            </a:r>
+          </a:p>
+        </p:txBody>
+      </p:sp>
+    </p:spTree>
+  </p:cSld>
+</p:sld>
+</file>
+
+<file path=ppt/slides/slide7.xml><?xml version="1.0" encoding="utf-8"?>
+<p:sld xmlns:a="http://schemas.openxmlformats.org/drawingml/2006/main" xmlns:r="http://schemas.openxmlformats.org/officeDocument/2006/relationships" xmlns:p="http://schemas.openxmlformats.org/presentationml/2006/main">
+  <p:cSld>
+    <p:spTree>
+      <p:nvGrpSpPr>
+        <p:cNvPr id="1" name=""/>
+        <p:cNvGrpSpPr/>
+        <p:nvPr/>
+      </p:nvGrpSpPr>
+      <p:grpSpPr>
+        <a:xfrm>
+          <a:off x="0" y="0"/>
+          <a:ext cx="0" cy="0"/>
+          <a:chOff x="0" y="0"/>
+          <a:chExt cx="0" cy="0"/>
+        </a:xfrm>
+      </p:grpSpPr>
+      <p:sp>
+        <p:nvSpPr>
+          <p:cNvPr id="2" name="Title 1"/>
+          <p:cNvSpPr>
+            <a:spLocks noGrp="1"/>
+          </p:cNvSpPr>
+          <p:nvPr>
+            <p:ph type="title"/>
+          </p:nvPr>
+        </p:nvSpPr>
+        <p:spPr/>
+        <p:txBody>
+          <a:bodyPr/>
+          <a:lstStyle/>
+          <a:p>
+            <a:pPr lvl="0" marL="0" indent="0">
+              <a:buNone/>
+            </a:pPr>
+            <a:r>
+              <a:rPr/>
+              <a:t>Restructuring</a:t>
+            </a:r>
+          </a:p>
+        </p:txBody>
+      </p:sp>
+      <p:sp>
+        <p:nvSpPr>
+          <p:cNvPr id="3" name="Content Placeholder 2"/>
+          <p:cNvSpPr>
+            <a:spLocks noGrp="1"/>
+          </p:cNvSpPr>
+          <p:nvPr>
+            <p:ph idx="1"/>
+          </p:nvPr>
+        </p:nvSpPr>
+        <p:spPr/>
+        <p:txBody>
+          <a:bodyPr/>
+          <a:lstStyle/>
+          <a:p>
+            <a:pPr lvl="1"/>
+            <a:r>
+              <a:rPr/>
+              <a:t>Output</a:t>
+            </a:r>
+          </a:p>
+          <a:p>
+            <a:pPr lvl="0" marL="1270000" indent="0">
+              <a:buNone/>
+            </a:pPr>
+            <a:r>
+              <a:rPr sz="1800">
+                <a:latin typeface="Courier"/>
+              </a:rPr>
+              <a:t>##   id depression_score time
+## 1  1                2    0
+## 2  1                4    3
+## 3  2                2    0
+## 4  2                4    3
+## 5  3                2    0</a:t>
             </a:r>
           </a:p>
         </p:txBody>

</xml_diff>

<commit_message>
Start work on cholestg
</commit_message>
<xml_diff>
--- a/module15-gathering-and-spreading/gather.pptx
+++ b/module15-gathering-and-spreading/gather.pptx
@@ -5,7 +5,7 @@
     <p:sldMasterId id="2147483648" r:id="rId1"/>
   </p:sldMasterIdLst>
   <p:notesMasterIdLst>
-    <p:NotesMasterId r:id="rId9"/>
+    <p:NotesMasterId r:id="rId11"/>
   </p:notesMasterIdLst>
   <p:sldIdLst>
     <p:sldId id="256" r:id="rId2"/>
@@ -15,6 +15,8 @@
     <p:sldId id="260" r:id="rId6"/>
     <p:sldId id="261" r:id="rId7"/>
     <p:sldId id="262" r:id="rId8"/>
+    <p:sldId id="263" r:id="rId9"/>
+    <p:sldId id="264" r:id="rId10"/>
   </p:sldIdLst>
   <p:sldSz cx="9144000" cy="6858000" type="screen4x3"/>
   <p:notesSz cx="6858000" cy="9144000"/>
@@ -966,6 +968,82 @@
               <a:t>term.</a:t>
             </a:r>
           </a:p>
+          <a:p>
+            <a:pPr lvl="0" marL="0" indent="0">
+              <a:buNone/>
+            </a:pPr>
+          </a:p>
+          <a:p>
+            <a:pPr lvl="0" marL="0" indent="0">
+              <a:buNone/>
+            </a:pPr>
+            <a:r>
+              <a:rPr/>
+              <a:t>The</a:t>
+            </a:r>
+            <a:r>
+              <a:rPr/>
+              <a:t> </a:t>
+            </a:r>
+            <a:r>
+              <a:rPr/>
+              <a:t>source</a:t>
+            </a:r>
+            <a:r>
+              <a:rPr/>
+              <a:t> </a:t>
+            </a:r>
+            <a:r>
+              <a:rPr/>
+              <a:t>for</a:t>
+            </a:r>
+            <a:r>
+              <a:rPr/>
+              <a:t> </a:t>
+            </a:r>
+            <a:r>
+              <a:rPr/>
+              <a:t>this</a:t>
+            </a:r>
+            <a:r>
+              <a:rPr/>
+              <a:t> </a:t>
+            </a:r>
+            <a:r>
+              <a:rPr/>
+              <a:t>data</a:t>
+            </a:r>
+            <a:r>
+              <a:rPr/>
+              <a:t> </a:t>
+            </a:r>
+            <a:r>
+              <a:rPr/>
+              <a:t>set</a:t>
+            </a:r>
+            <a:r>
+              <a:rPr/>
+              <a:t> </a:t>
+            </a:r>
+            <a:r>
+              <a:rPr/>
+              <a:t>is</a:t>
+            </a:r>
+          </a:p>
+          <a:p>
+            <a:pPr lvl="0" marL="0" indent="0">
+              <a:buNone/>
+            </a:pPr>
+          </a:p>
+          <a:p>
+            <a:pPr lvl="0" marL="0" indent="0">
+              <a:buNone/>
+            </a:pPr>
+            <a:r>
+              <a:rPr/>
+              <a:t>STatSci.org</a:t>
+            </a:r>
+          </a:p>
         </p:txBody>
       </p:sp>
       <p:sp>
@@ -1331,7 +1409,7 @@
           <a:p>
             <a:fld id="{18BDFEC3-8487-43E8-A154-7C12CBC1FFF2}" type="slidenum">
               <a:rPr lang="en-US"/>
-              <a:t>3</a:t>
+              <a:t>4</a:t>
             </a:fld>
             <a:endParaRPr lang="en-US"/>
           </a:p>
@@ -1573,7 +1651,7 @@
           <a:p>
             <a:fld id="{18BDFEC3-8487-43E8-A154-7C12CBC1FFF2}" type="slidenum">
               <a:rPr lang="en-US"/>
-              <a:t>4</a:t>
+              <a:t>5</a:t>
             </a:fld>
             <a:endParaRPr lang="en-US"/>
           </a:p>
@@ -4996,30 +5074,9 @@
               </a:rPr>
               <a:t>select *
   from earthquake_table
-  limit 5</a:t>
-            </a:r>
-          </a:p>
-          <a:p>
-            <a:pPr lvl="1"/>
-            <a:r>
-              <a:rPr/>
-              <a:t>Output</a:t>
-            </a:r>
-          </a:p>
-          <a:p>
-            <a:pPr lvl="0" marL="1270000" indent="0">
-              <a:buNone/>
-            </a:pPr>
-            <a:r>
-              <a:rPr sz="1800">
-                <a:latin typeface="Courier"/>
-              </a:rPr>
-              <a:t>##   Week0 Week3 Week6 Week9 Week12
-## 1     6    10     8     4      6
-## 2     2     4     8     5      6
-## 3     2     4     8     5      6
-## 4     4     5     8    10      7
-## 5     4     7     9     7     12</a:t>
+  limit 5
+select count(*) as n_records
+   from earthquake_table</a:t>
             </a:r>
           </a:p>
         </p:txBody>
@@ -5066,31 +5123,39 @@
             </a:pPr>
             <a:r>
               <a:rPr/>
-              <a:t>Adding</a:t>
-            </a:r>
-            <a:r>
-              <a:rPr/>
-              <a:t> </a:t>
-            </a:r>
-            <a:r>
-              <a:rPr/>
-              <a:t>a</a:t>
-            </a:r>
-            <a:r>
-              <a:rPr/>
-              <a:t> </a:t>
-            </a:r>
-            <a:r>
-              <a:rPr/>
-              <a:t>primary</a:t>
-            </a:r>
-            <a:r>
-              <a:rPr/>
-              <a:t> </a:t>
-            </a:r>
-            <a:r>
-              <a:rPr/>
-              <a:t>key</a:t>
+              <a:t>lomaprie_db,</a:t>
+            </a:r>
+            <a:r>
+              <a:rPr/>
+              <a:t> </a:t>
+            </a:r>
+            <a:r>
+              <a:rPr/>
+              <a:t>listing</a:t>
+            </a:r>
+            <a:r>
+              <a:rPr/>
+              <a:t> </a:t>
+            </a:r>
+            <a:r>
+              <a:rPr/>
+              <a:t>of</a:t>
+            </a:r>
+            <a:r>
+              <a:rPr/>
+              <a:t> </a:t>
+            </a:r>
+            <a:r>
+              <a:rPr/>
+              <a:t>original</a:t>
+            </a:r>
+            <a:r>
+              <a:rPr/>
+              <a:t> </a:t>
+            </a:r>
+            <a:r>
+              <a:rPr/>
+              <a:t>table</a:t>
             </a:r>
           </a:p>
         </p:txBody>
@@ -5113,7 +5178,7 @@
             <a:pPr lvl="1"/>
             <a:r>
               <a:rPr/>
-              <a:t>SQL code</a:t>
+              <a:t>Output</a:t>
             </a:r>
           </a:p>
           <a:p>
@@ -5124,17 +5189,12 @@
               <a:rPr sz="1800">
                 <a:latin typeface="Courier"/>
               </a:rPr>
-              <a:t>select row_number() over (order by week0) as id, 
-  week0, week3, week6, week9, week12 
-  from earthquake_table
-  limit 5</a:t>
-            </a:r>
-          </a:p>
-          <a:p>
-            <a:pPr lvl="1"/>
-            <a:r>
-              <a:rPr/>
-              <a:t>Output</a:t>
+              <a:t>##   Week0 Week3 Week6 Week9 Week12
+## 1     6    10     8     4      6
+## 2     2     4     8     5      6
+## 3     2     4     8     5      6
+## 4     4     5     8    10      7
+## 5     4     7     9     7     12</a:t>
             </a:r>
           </a:p>
           <a:p>
@@ -5145,12 +5205,8 @@
               <a:rPr sz="1800">
                 <a:latin typeface="Courier"/>
               </a:rPr>
-              <a:t>##   id Week0 Week3 Week6 Week9 Week12
-## 1  1     2     4     8     5      6
-## 2  2     2     4     8     5      6
-## 3  3     2     9    11     8      8
-## 4  4     4     5     8    10      7
-## 5  5     4     7     9     7     12</a:t>
+              <a:t>##   n_records
+## 1        25</a:t>
             </a:r>
           </a:p>
         </p:txBody>
@@ -5197,39 +5253,31 @@
             </a:pPr>
             <a:r>
               <a:rPr/>
-              <a:t>What</a:t>
-            </a:r>
-            <a:r>
-              <a:rPr/>
-              <a:t> </a:t>
-            </a:r>
-            <a:r>
-              <a:rPr/>
-              <a:t>is</a:t>
-            </a:r>
-            <a:r>
-              <a:rPr/>
-              <a:t> </a:t>
-            </a:r>
-            <a:r>
-              <a:rPr/>
-              <a:t>this</a:t>
-            </a:r>
-            <a:r>
-              <a:rPr/>
-              <a:t> </a:t>
-            </a:r>
-            <a:r>
-              <a:rPr/>
-              <a:t>row_number</a:t>
-            </a:r>
-            <a:r>
-              <a:rPr/>
-              <a:t> </a:t>
-            </a:r>
-            <a:r>
-              <a:rPr/>
-              <a:t>function</a:t>
+              <a:t>Adding</a:t>
+            </a:r>
+            <a:r>
+              <a:rPr/>
+              <a:t> </a:t>
+            </a:r>
+            <a:r>
+              <a:rPr/>
+              <a:t>a</a:t>
+            </a:r>
+            <a:r>
+              <a:rPr/>
+              <a:t> </a:t>
+            </a:r>
+            <a:r>
+              <a:rPr/>
+              <a:t>primary</a:t>
+            </a:r>
+            <a:r>
+              <a:rPr/>
+              <a:t> </a:t>
+            </a:r>
+            <a:r>
+              <a:rPr/>
+              <a:t>key</a:t>
             </a:r>
           </a:p>
         </p:txBody>
@@ -5252,28 +5300,45 @@
             <a:pPr lvl="1"/>
             <a:r>
               <a:rPr/>
-              <a:t>Windowing function</a:t>
-            </a:r>
-          </a:p>
-          <a:p>
-            <a:pPr lvl="2"/>
-            <a:r>
-              <a:rPr/>
-              <a:t>Not a single row function</a:t>
+              <a:t>SQL code</a:t>
+            </a:r>
+          </a:p>
+          <a:p>
+            <a:pPr lvl="0" marL="1270000" indent="0">
+              <a:buNone/>
+            </a:pPr>
+            <a:r>
+              <a:rPr sz="1800">
+                <a:latin typeface="Courier"/>
+              </a:rPr>
+              <a:t>select 
+  row_number() over (order by week0) as id, 
+  week0, week3, week6, week9, week12 
+  from earthquake_table
+  limit 5</a:t>
             </a:r>
           </a:p>
           <a:p>
             <a:pPr lvl="1"/>
             <a:r>
               <a:rPr/>
-              <a:t>Adds a sequence number</a:t>
-            </a:r>
-          </a:p>
-          <a:p>
-            <a:pPr lvl="1"/>
-            <a:r>
-              <a:rPr/>
-              <a:t>Require an over keyword.</a:t>
+              <a:t>Output</a:t>
+            </a:r>
+          </a:p>
+          <a:p>
+            <a:pPr lvl="0" marL="1270000" indent="0">
+              <a:buNone/>
+            </a:pPr>
+            <a:r>
+              <a:rPr sz="1800">
+                <a:latin typeface="Courier"/>
+              </a:rPr>
+              <a:t>##   id Week0 Week3 Week6 Week9 Week12
+## 1  1     2     4     8     5      6
+## 2  2     2     4     8     5      6
+## 3  3     2     9    11     8      8
+## 4  4     4     5     8    10      7
+## 5  5     4     7     9     7     12</a:t>
             </a:r>
           </a:p>
         </p:txBody>
@@ -5320,7 +5385,39 @@
             </a:pPr>
             <a:r>
               <a:rPr/>
-              <a:t>Restructuring</a:t>
+              <a:t>What</a:t>
+            </a:r>
+            <a:r>
+              <a:rPr/>
+              <a:t> </a:t>
+            </a:r>
+            <a:r>
+              <a:rPr/>
+              <a:t>is</a:t>
+            </a:r>
+            <a:r>
+              <a:rPr/>
+              <a:t> </a:t>
+            </a:r>
+            <a:r>
+              <a:rPr/>
+              <a:t>this</a:t>
+            </a:r>
+            <a:r>
+              <a:rPr/>
+              <a:t> </a:t>
+            </a:r>
+            <a:r>
+              <a:rPr/>
+              <a:t>row_number</a:t>
+            </a:r>
+            <a:r>
+              <a:rPr/>
+              <a:t> </a:t>
+            </a:r>
+            <a:r>
+              <a:rPr/>
+              <a:t>function</a:t>
             </a:r>
           </a:p>
         </p:txBody>
@@ -5343,27 +5440,28 @@
             <a:pPr lvl="1"/>
             <a:r>
               <a:rPr/>
-              <a:t>SQL code</a:t>
-            </a:r>
-          </a:p>
-          <a:p>
-            <a:pPr lvl="0" marL="1270000" indent="0">
-              <a:buNone/>
-            </a:pPr>
-            <a:r>
-              <a:rPr sz="1800">
-                <a:latin typeface="Courier"/>
-              </a:rPr>
-              <a:t>select row_number() over (order by week0) as id, 
-  week0 as depression_score,
-  0 as time
-  from earthquake_table
-  union
-    select row_number() over (order by week0) as id,
-    week3 as depression_score,
-    3 as time
-    from earthquake_table
-  limit 5</a:t>
+              <a:t>Windowing function</a:t>
+            </a:r>
+          </a:p>
+          <a:p>
+            <a:pPr lvl="2"/>
+            <a:r>
+              <a:rPr/>
+              <a:t>Not a single row function</a:t>
+            </a:r>
+          </a:p>
+          <a:p>
+            <a:pPr lvl="1"/>
+            <a:r>
+              <a:rPr/>
+              <a:t>Adds a sequence number</a:t>
+            </a:r>
+          </a:p>
+          <a:p>
+            <a:pPr lvl="1"/>
+            <a:r>
+              <a:rPr/>
+              <a:t>Require an over keyword.</a:t>
             </a:r>
           </a:p>
         </p:txBody>
@@ -5433,7 +5531,7 @@
             <a:pPr lvl="1"/>
             <a:r>
               <a:rPr/>
-              <a:t>Output</a:t>
+              <a:t>SQL code</a:t>
             </a:r>
           </a:p>
           <a:p>
@@ -5444,12 +5542,217 @@
               <a:rPr sz="1800">
                 <a:latin typeface="Courier"/>
               </a:rPr>
-              <a:t>##   id depression_score time
-## 1  1                2    0
-## 2  1                4    3
-## 3  2                2    0
-## 4  2                4    3
-## 5  3                2    0</a:t>
+              <a:t>select 
+  row_number() over (order by week0) as id, 
+  week0 as depression_score, 0 as time
+  from earthquake_table
+union select
+  row_number() over (order by week0) as id,
+  week3 as depression_score, 3 as time
+  from earthquake_table
+union select
+  row_number() over (order by week0) as id,
+  week6 as depression_score, 6 as time
+  from earthquake_table</a:t>
+            </a:r>
+          </a:p>
+        </p:txBody>
+      </p:sp>
+    </p:spTree>
+  </p:cSld>
+</p:sld>
+</file>
+
+<file path=ppt/slides/slide8.xml><?xml version="1.0" encoding="utf-8"?>
+<p:sld xmlns:a="http://schemas.openxmlformats.org/drawingml/2006/main" xmlns:r="http://schemas.openxmlformats.org/officeDocument/2006/relationships" xmlns:p="http://schemas.openxmlformats.org/presentationml/2006/main">
+  <p:cSld>
+    <p:spTree>
+      <p:nvGrpSpPr>
+        <p:cNvPr id="1" name=""/>
+        <p:cNvGrpSpPr/>
+        <p:nvPr/>
+      </p:nvGrpSpPr>
+      <p:grpSpPr>
+        <a:xfrm>
+          <a:off x="0" y="0"/>
+          <a:ext cx="0" cy="0"/>
+          <a:chOff x="0" y="0"/>
+          <a:chExt cx="0" cy="0"/>
+        </a:xfrm>
+      </p:grpSpPr>
+      <p:sp>
+        <p:nvSpPr>
+          <p:cNvPr id="2" name="Title 1"/>
+          <p:cNvSpPr>
+            <a:spLocks noGrp="1"/>
+          </p:cNvSpPr>
+          <p:nvPr>
+            <p:ph type="title"/>
+          </p:nvPr>
+        </p:nvSpPr>
+        <p:spPr/>
+        <p:txBody>
+          <a:bodyPr/>
+          <a:lstStyle/>
+          <a:p>
+            <a:pPr lvl="0" marL="0" indent="0">
+              <a:buNone/>
+            </a:pPr>
+            <a:r>
+              <a:rPr/>
+              <a:t>Restructuring,</a:t>
+            </a:r>
+            <a:r>
+              <a:rPr/>
+              <a:t> </a:t>
+            </a:r>
+            <a:r>
+              <a:rPr/>
+              <a:t>part</a:t>
+            </a:r>
+            <a:r>
+              <a:rPr/>
+              <a:t> </a:t>
+            </a:r>
+            <a:r>
+              <a:rPr/>
+              <a:t>2</a:t>
+            </a:r>
+          </a:p>
+        </p:txBody>
+      </p:sp>
+      <p:sp>
+        <p:nvSpPr>
+          <p:cNvPr id="3" name="Content Placeholder 2"/>
+          <p:cNvSpPr>
+            <a:spLocks noGrp="1"/>
+          </p:cNvSpPr>
+          <p:nvPr>
+            <p:ph idx="1"/>
+          </p:nvPr>
+        </p:nvSpPr>
+        <p:spPr/>
+        <p:txBody>
+          <a:bodyPr/>
+          <a:lstStyle/>
+          <a:p>
+            <a:pPr lvl="1"/>
+            <a:r>
+              <a:rPr/>
+              <a:t>SQL code, continued</a:t>
+            </a:r>
+          </a:p>
+          <a:p>
+            <a:pPr lvl="0" marL="1270000" indent="0">
+              <a:buNone/>
+            </a:pPr>
+            <a:r>
+              <a:rPr sz="1800">
+                <a:latin typeface="Courier"/>
+              </a:rPr>
+              <a:t>union select
+  row_number() over (order by week0) as id,
+  week9 as depression_score, 9 as time
+  from earthquake_table
+union select 
+  row_number() over (order by week0) as id,
+  week12 as depression_score, 12 as time
+  from earthquake_table
+limit 13</a:t>
+            </a:r>
+          </a:p>
+        </p:txBody>
+      </p:sp>
+    </p:spTree>
+  </p:cSld>
+</p:sld>
+</file>
+
+<file path=ppt/slides/slide9.xml><?xml version="1.0" encoding="utf-8"?>
+<p:sld xmlns:a="http://schemas.openxmlformats.org/drawingml/2006/main" xmlns:r="http://schemas.openxmlformats.org/officeDocument/2006/relationships" xmlns:p="http://schemas.openxmlformats.org/presentationml/2006/main">
+  <p:cSld>
+    <p:spTree>
+      <p:nvGrpSpPr>
+        <p:cNvPr id="1" name=""/>
+        <p:cNvGrpSpPr/>
+        <p:nvPr/>
+      </p:nvGrpSpPr>
+      <p:grpSpPr>
+        <a:xfrm>
+          <a:off x="0" y="0"/>
+          <a:ext cx="0" cy="0"/>
+          <a:chOff x="0" y="0"/>
+          <a:chExt cx="0" cy="0"/>
+        </a:xfrm>
+      </p:grpSpPr>
+      <p:sp>
+        <p:nvSpPr>
+          <p:cNvPr id="2" name="Title 1"/>
+          <p:cNvSpPr>
+            <a:spLocks noGrp="1"/>
+          </p:cNvSpPr>
+          <p:nvPr>
+            <p:ph type="title"/>
+          </p:nvPr>
+        </p:nvSpPr>
+        <p:spPr/>
+        <p:txBody>
+          <a:bodyPr/>
+          <a:lstStyle/>
+          <a:p>
+            <a:pPr lvl="0" marL="0" indent="0">
+              <a:buNone/>
+            </a:pPr>
+            <a:r>
+              <a:rPr/>
+              <a:t>Restructuring</a:t>
+            </a:r>
+          </a:p>
+        </p:txBody>
+      </p:sp>
+      <p:sp>
+        <p:nvSpPr>
+          <p:cNvPr id="3" name="Content Placeholder 2"/>
+          <p:cNvSpPr>
+            <a:spLocks noGrp="1"/>
+          </p:cNvSpPr>
+          <p:nvPr>
+            <p:ph idx="1"/>
+          </p:nvPr>
+        </p:nvSpPr>
+        <p:spPr/>
+        <p:txBody>
+          <a:bodyPr/>
+          <a:lstStyle/>
+          <a:p>
+            <a:pPr lvl="1"/>
+            <a:r>
+              <a:rPr/>
+              <a:t>Output</a:t>
+            </a:r>
+          </a:p>
+          <a:p>
+            <a:pPr lvl="0" marL="1270000" indent="0">
+              <a:buNone/>
+            </a:pPr>
+            <a:r>
+              <a:rPr sz="1800">
+                <a:latin typeface="Courier"/>
+              </a:rPr>
+              <a:t>##    id depression_score time
+## 1   1                2    0
+## 2   1                4    3
+## 3   1                5    9
+## 4   1                6   12
+## 5   1                8    6
+## 6   2                2    0
+## 7   2                4    3
+## 8   2                5    9
+## 9   2                6   12
+## 10  2                8    6
+## 11  3                2    0
+## 12  3                8    9
+## 13  3                8   12</a:t>
             </a:r>
           </a:p>
         </p:txBody>

</xml_diff>

<commit_message>
Added key to lomaprie, created cholestg
</commit_message>
<xml_diff>
--- a/module15-gathering-and-spreading/gather.pptx
+++ b/module15-gathering-and-spreading/gather.pptx
@@ -5,7 +5,7 @@
     <p:sldMasterId id="2147483648" r:id="rId1"/>
   </p:sldMasterIdLst>
   <p:notesMasterIdLst>
-    <p:NotesMasterId r:id="rId11"/>
+    <p:NotesMasterId r:id="rId10"/>
   </p:notesMasterIdLst>
   <p:sldIdLst>
     <p:sldId id="256" r:id="rId2"/>
@@ -16,7 +16,6 @@
     <p:sldId id="261" r:id="rId7"/>
     <p:sldId id="262" r:id="rId8"/>
     <p:sldId id="263" r:id="rId9"/>
-    <p:sldId id="264" r:id="rId10"/>
   </p:sldIdLst>
   <p:sldSz cx="9144000" cy="6858000" type="screen4x3"/>
   <p:notesSz cx="6858000" cy="9144000"/>
@@ -1041,7 +1040,7 @@
             </a:pPr>
             <a:r>
               <a:rPr/>
-              <a:t>STatSci.org</a:t>
+              <a:t>http://www.statsci.org/data/general/lomaprie.html</a:t>
             </a:r>
           </a:p>
         </p:txBody>
@@ -1410,248 +1409,6 @@
             <a:fld id="{18BDFEC3-8487-43E8-A154-7C12CBC1FFF2}" type="slidenum">
               <a:rPr lang="en-US"/>
               <a:t>4</a:t>
-            </a:fld>
-            <a:endParaRPr lang="en-US"/>
-          </a:p>
-        </p:txBody>
-      </p:sp>
-    </p:spTree>
-  </p:cSld>
-</p:notes>
-</file>
-
-<file path=ppt/notesSlides/notesSlide3.xml><?xml version="1.0" encoding="utf-8"?>
-<p:notes xmlns:a="http://schemas.openxmlformats.org/drawingml/2006/main" xmlns:r="http://schemas.openxmlformats.org/officeDocument/2006/relationships" xmlns:p="http://schemas.openxmlformats.org/presentationml/2006/main">
-  <p:cSld>
-    <p:spTree>
-      <p:nvGrpSpPr>
-        <p:cNvPr id="1" name=""/>
-        <p:cNvGrpSpPr/>
-        <p:nvPr/>
-      </p:nvGrpSpPr>
-      <p:grpSpPr>
-        <a:xfrm>
-          <a:off x="0" y="0"/>
-          <a:ext cx="0" cy="0"/>
-          <a:chOff x="0" y="0"/>
-          <a:chExt cx="0" cy="0"/>
-        </a:xfrm>
-      </p:grpSpPr>
-      <p:sp>
-        <p:nvSpPr>
-          <p:cNvPr id="2" name="Slide Image Placeholder 1"/>
-          <p:cNvSpPr>
-            <a:spLocks noGrp="1" noRot="1" noChangeAspect="1"/>
-          </p:cNvSpPr>
-          <p:nvPr>
-            <p:ph type="sldImg"/>
-          </p:nvPr>
-        </p:nvSpPr>
-        <p:spPr/>
-      </p:sp>
-      <p:sp>
-        <p:nvSpPr>
-          <p:cNvPr id="3" name="Notes Placeholder 2"/>
-          <p:cNvSpPr>
-            <a:spLocks noGrp="1"/>
-          </p:cNvSpPr>
-          <p:nvPr>
-            <p:ph type="body" idx="1"/>
-          </p:nvPr>
-        </p:nvSpPr>
-        <p:spPr/>
-        <p:txBody>
-          <a:bodyPr/>
-          <a:lstStyle/>
-          <a:p>
-            <a:pPr lvl="0" marL="0" indent="0">
-              <a:buNone/>
-            </a:pPr>
-            <a:r>
-              <a:rPr/>
-              <a:t>Here</a:t>
-            </a:r>
-            <a:r>
-              <a:rPr/>
-              <a:t> </a:t>
-            </a:r>
-            <a:r>
-              <a:rPr/>
-              <a:t>is</a:t>
-            </a:r>
-            <a:r>
-              <a:rPr/>
-              <a:t> </a:t>
-            </a:r>
-            <a:r>
-              <a:rPr/>
-              <a:t>the</a:t>
-            </a:r>
-            <a:r>
-              <a:rPr/>
-              <a:t> </a:t>
-            </a:r>
-            <a:r>
-              <a:rPr/>
-              <a:t>data</a:t>
-            </a:r>
-            <a:r>
-              <a:rPr/>
-              <a:t> </a:t>
-            </a:r>
-            <a:r>
-              <a:rPr/>
-              <a:t>table</a:t>
-            </a:r>
-            <a:r>
-              <a:rPr/>
-              <a:t> </a:t>
-            </a:r>
-            <a:r>
-              <a:rPr/>
-              <a:t>with</a:t>
-            </a:r>
-            <a:r>
-              <a:rPr/>
-              <a:t> </a:t>
-            </a:r>
-            <a:r>
-              <a:rPr/>
-              <a:t>a</a:t>
-            </a:r>
-            <a:r>
-              <a:rPr/>
-              <a:t> </a:t>
-            </a:r>
-            <a:r>
-              <a:rPr/>
-              <a:t>primary</a:t>
-            </a:r>
-            <a:r>
-              <a:rPr/>
-              <a:t> </a:t>
-            </a:r>
-            <a:r>
-              <a:rPr/>
-              <a:t>key</a:t>
-            </a:r>
-            <a:r>
-              <a:rPr/>
-              <a:t> </a:t>
-            </a:r>
-            <a:r>
-              <a:rPr/>
-              <a:t>added.</a:t>
-            </a:r>
-            <a:r>
-              <a:rPr/>
-              <a:t> </a:t>
-            </a:r>
-            <a:r>
-              <a:rPr/>
-              <a:t>You</a:t>
-            </a:r>
-            <a:r>
-              <a:rPr/>
-              <a:t> </a:t>
-            </a:r>
-            <a:r>
-              <a:rPr/>
-              <a:t>will</a:t>
-            </a:r>
-            <a:r>
-              <a:rPr/>
-              <a:t> </a:t>
-            </a:r>
-            <a:r>
-              <a:rPr/>
-              <a:t>need</a:t>
-            </a:r>
-            <a:r>
-              <a:rPr/>
-              <a:t> </a:t>
-            </a:r>
-            <a:r>
-              <a:rPr/>
-              <a:t>this</a:t>
-            </a:r>
-            <a:r>
-              <a:rPr/>
-              <a:t> </a:t>
-            </a:r>
-            <a:r>
-              <a:rPr/>
-              <a:t>before</a:t>
-            </a:r>
-            <a:r>
-              <a:rPr/>
-              <a:t> </a:t>
-            </a:r>
-            <a:r>
-              <a:rPr/>
-              <a:t>you</a:t>
-            </a:r>
-            <a:r>
-              <a:rPr/>
-              <a:t> </a:t>
-            </a:r>
-            <a:r>
-              <a:rPr/>
-              <a:t>try</a:t>
-            </a:r>
-            <a:r>
-              <a:rPr/>
-              <a:t> </a:t>
-            </a:r>
-            <a:r>
-              <a:rPr/>
-              <a:t>to</a:t>
-            </a:r>
-            <a:r>
-              <a:rPr/>
-              <a:t> </a:t>
-            </a:r>
-            <a:r>
-              <a:rPr/>
-              <a:t>restructure</a:t>
-            </a:r>
-            <a:r>
-              <a:rPr/>
-              <a:t> </a:t>
-            </a:r>
-            <a:r>
-              <a:rPr/>
-              <a:t>your</a:t>
-            </a:r>
-            <a:r>
-              <a:rPr/>
-              <a:t> </a:t>
-            </a:r>
-            <a:r>
-              <a:rPr/>
-              <a:t>data.</a:t>
-            </a:r>
-          </a:p>
-        </p:txBody>
-      </p:sp>
-      <p:sp>
-        <p:nvSpPr>
-          <p:cNvPr id="4" name="Slide Number Placeholder 3"/>
-          <p:cNvSpPr>
-            <a:spLocks noGrp="1"/>
-          </p:cNvSpPr>
-          <p:nvPr>
-            <p:ph type="sldNum" sz="quarter" idx="10"/>
-          </p:nvPr>
-        </p:nvSpPr>
-        <p:spPr/>
-        <p:txBody>
-          <a:bodyPr/>
-          <a:lstStyle/>
-          <a:p>
-            <a:fld id="{18BDFEC3-8487-43E8-A154-7C12CBC1FFF2}" type="slidenum">
-              <a:rPr lang="en-US"/>
-              <a:t>5</a:t>
             </a:fld>
             <a:endParaRPr lang="en-US"/>
           </a:p>
@@ -5189,12 +4946,12 @@
               <a:rPr sz="1800">
                 <a:latin typeface="Courier"/>
               </a:rPr>
-              <a:t>##   Week0 Week3 Week6 Week9 Week12
-## 1     6    10     8     4      6
-## 2     2     4     8     5      6
-## 3     2     4     8     5      6
-## 4     4     5     8    10      7
-## 5     4     7     9     7     12</a:t>
+              <a:t>##   id Week0 Week3 Week6 Week9 Week12
+## 1  1     6    10     8     4      6
+## 2  2     2     4     8     5      6
+## 3  3     2     4     8     5      6
+## 4  4     4     5     8    10      7
+## 5  5     4     7     9     7     12</a:t>
             </a:r>
           </a:p>
           <a:p>
@@ -5253,31 +5010,15 @@
             </a:pPr>
             <a:r>
               <a:rPr/>
-              <a:t>Adding</a:t>
-            </a:r>
-            <a:r>
-              <a:rPr/>
-              <a:t> </a:t>
-            </a:r>
-            <a:r>
-              <a:rPr/>
-              <a:t>a</a:t>
-            </a:r>
-            <a:r>
-              <a:rPr/>
-              <a:t> </a:t>
-            </a:r>
-            <a:r>
-              <a:rPr/>
-              <a:t>primary</a:t>
-            </a:r>
-            <a:r>
-              <a:rPr/>
-              <a:t> </a:t>
-            </a:r>
-            <a:r>
-              <a:rPr/>
-              <a:t>key</a:t>
+              <a:t>Test</a:t>
+            </a:r>
+            <a:r>
+              <a:rPr/>
+              <a:t> </a:t>
+            </a:r>
+            <a:r>
+              <a:rPr/>
+              <a:t>slide</a:t>
             </a:r>
           </a:p>
         </p:txBody>
@@ -5296,13 +5037,6 @@
         <p:txBody>
           <a:bodyPr/>
           <a:lstStyle/>
-          <a:p>
-            <a:pPr lvl="1"/>
-            <a:r>
-              <a:rPr/>
-              <a:t>SQL code</a:t>
-            </a:r>
-          </a:p>
           <a:p>
             <a:pPr lvl="0" marL="1270000" indent="0">
               <a:buNone/>
@@ -5311,34 +5045,21 @@
               <a:rPr sz="1800">
                 <a:latin typeface="Courier"/>
               </a:rPr>
-              <a:t>select 
-  row_number() over (order by week0) as id, 
-  week0, week3, week6, week9, week12 
-  from earthquake_table
-  limit 5</a:t>
-            </a:r>
-          </a:p>
-          <a:p>
-            <a:pPr lvl="1"/>
-            <a:r>
-              <a:rPr/>
-              <a:t>Output</a:t>
-            </a:r>
-          </a:p>
-          <a:p>
-            <a:pPr lvl="0" marL="1270000" indent="0">
-              <a:buNone/>
-            </a:pPr>
-            <a:r>
-              <a:rPr sz="1800">
-                <a:latin typeface="Courier"/>
-              </a:rPr>
-              <a:t>##   id Week0 Week3 Week6 Week9 Week12
-## 1  1     2     4     8     5      6
-## 2  2     2     4     8     5      6
-## 3  3     2     9    11     8      8
-## 4  4     4     5     8    10      7
-## 5  5     4     7     9     7     12</a:t>
+              <a:t>r01      1    1    2    2    3    3    4    4  4
+r02 5    0    5    0    5    0    5    0    5  8
+r03
+r04      1    1    2    2    3    3    4    4  4
+r05 5    0    5    0    5    0    5    0    5  8
+r06
+r07      1    1    2    2    3    3    4    4  4
+r08 5    0    5    0    5    0    5    0    5  8
+r09
+r10      1    1    2    2    3    3    4    4  4
+r11 5    0    5    0    5    0    5    0    5  8
+r12
+r13      1    1    2    2    3    3    4    4  4
+r14 5    0    5    0    5    0    5    0    5  8
+r15</a:t>
             </a:r>
           </a:p>
         </p:txBody>
@@ -5385,39 +5106,7 @@
             </a:pPr>
             <a:r>
               <a:rPr/>
-              <a:t>What</a:t>
-            </a:r>
-            <a:r>
-              <a:rPr/>
-              <a:t> </a:t>
-            </a:r>
-            <a:r>
-              <a:rPr/>
-              <a:t>is</a:t>
-            </a:r>
-            <a:r>
-              <a:rPr/>
-              <a:t> </a:t>
-            </a:r>
-            <a:r>
-              <a:rPr/>
-              <a:t>this</a:t>
-            </a:r>
-            <a:r>
-              <a:rPr/>
-              <a:t> </a:t>
-            </a:r>
-            <a:r>
-              <a:rPr/>
-              <a:t>row_number</a:t>
-            </a:r>
-            <a:r>
-              <a:rPr/>
-              <a:t> </a:t>
-            </a:r>
-            <a:r>
-              <a:rPr/>
-              <a:t>function</a:t>
+              <a:t>Restructuring</a:t>
             </a:r>
           </a:p>
         </p:txBody>
@@ -5440,28 +5129,26 @@
             <a:pPr lvl="1"/>
             <a:r>
               <a:rPr/>
-              <a:t>Windowing function</a:t>
-            </a:r>
-          </a:p>
-          <a:p>
-            <a:pPr lvl="2"/>
-            <a:r>
-              <a:rPr/>
-              <a:t>Not a single row function</a:t>
-            </a:r>
-          </a:p>
-          <a:p>
-            <a:pPr lvl="1"/>
-            <a:r>
-              <a:rPr/>
-              <a:t>Adds a sequence number</a:t>
-            </a:r>
-          </a:p>
-          <a:p>
-            <a:pPr lvl="1"/>
-            <a:r>
-              <a:rPr/>
-              <a:t>Require an over keyword.</a:t>
+              <a:t>SQL code</a:t>
+            </a:r>
+          </a:p>
+          <a:p>
+            <a:pPr lvl="0" marL="1270000" indent="0">
+              <a:buNone/>
+            </a:pPr>
+            <a:r>
+              <a:rPr sz="1800">
+                <a:latin typeface="Courier"/>
+              </a:rPr>
+              <a:t>select 
+  id, week0 as depression_score, 0 as time
+  from earthquake_table
+union select
+  id, week3 as depression_score, 3 as time
+  from earthquake_table
+union select
+  id, week6 as depression_score, 6 as time
+  from earthquake_table</a:t>
             </a:r>
           </a:p>
         </p:txBody>
@@ -5508,7 +5195,23 @@
             </a:pPr>
             <a:r>
               <a:rPr/>
-              <a:t>Restructuring</a:t>
+              <a:t>Restructuring,</a:t>
+            </a:r>
+            <a:r>
+              <a:rPr/>
+              <a:t> </a:t>
+            </a:r>
+            <a:r>
+              <a:rPr/>
+              <a:t>part</a:t>
+            </a:r>
+            <a:r>
+              <a:rPr/>
+              <a:t> </a:t>
+            </a:r>
+            <a:r>
+              <a:rPr/>
+              <a:t>2</a:t>
             </a:r>
           </a:p>
         </p:txBody>
@@ -5531,7 +5234,7 @@
             <a:pPr lvl="1"/>
             <a:r>
               <a:rPr/>
-              <a:t>SQL code</a:t>
+              <a:t>SQL code, continued</a:t>
             </a:r>
           </a:p>
           <a:p>
@@ -5542,18 +5245,13 @@
               <a:rPr sz="1800">
                 <a:latin typeface="Courier"/>
               </a:rPr>
-              <a:t>select 
-  row_number() over (order by week0) as id, 
-  week0 as depression_score, 0 as time
+              <a:t>union select
+  id, week9 as depression_score, 9 as time
   from earthquake_table
-union select
-  row_number() over (order by week0) as id,
-  week3 as depression_score, 3 as time
+union 
+  select id, week12 as depression_score, 12 as time
   from earthquake_table
-union select
-  row_number() over (order by week0) as id,
-  week6 as depression_score, 6 as time
-  from earthquake_table</a:t>
+limit 13</a:t>
             </a:r>
           </a:p>
         </p:txBody>
@@ -5600,111 +5298,6 @@
             </a:pPr>
             <a:r>
               <a:rPr/>
-              <a:t>Restructuring,</a:t>
-            </a:r>
-            <a:r>
-              <a:rPr/>
-              <a:t> </a:t>
-            </a:r>
-            <a:r>
-              <a:rPr/>
-              <a:t>part</a:t>
-            </a:r>
-            <a:r>
-              <a:rPr/>
-              <a:t> </a:t>
-            </a:r>
-            <a:r>
-              <a:rPr/>
-              <a:t>2</a:t>
-            </a:r>
-          </a:p>
-        </p:txBody>
-      </p:sp>
-      <p:sp>
-        <p:nvSpPr>
-          <p:cNvPr id="3" name="Content Placeholder 2"/>
-          <p:cNvSpPr>
-            <a:spLocks noGrp="1"/>
-          </p:cNvSpPr>
-          <p:nvPr>
-            <p:ph idx="1"/>
-          </p:nvPr>
-        </p:nvSpPr>
-        <p:spPr/>
-        <p:txBody>
-          <a:bodyPr/>
-          <a:lstStyle/>
-          <a:p>
-            <a:pPr lvl="1"/>
-            <a:r>
-              <a:rPr/>
-              <a:t>SQL code, continued</a:t>
-            </a:r>
-          </a:p>
-          <a:p>
-            <a:pPr lvl="0" marL="1270000" indent="0">
-              <a:buNone/>
-            </a:pPr>
-            <a:r>
-              <a:rPr sz="1800">
-                <a:latin typeface="Courier"/>
-              </a:rPr>
-              <a:t>union select
-  row_number() over (order by week0) as id,
-  week9 as depression_score, 9 as time
-  from earthquake_table
-union select 
-  row_number() over (order by week0) as id,
-  week12 as depression_score, 12 as time
-  from earthquake_table
-limit 13</a:t>
-            </a:r>
-          </a:p>
-        </p:txBody>
-      </p:sp>
-    </p:spTree>
-  </p:cSld>
-</p:sld>
-</file>
-
-<file path=ppt/slides/slide9.xml><?xml version="1.0" encoding="utf-8"?>
-<p:sld xmlns:a="http://schemas.openxmlformats.org/drawingml/2006/main" xmlns:r="http://schemas.openxmlformats.org/officeDocument/2006/relationships" xmlns:p="http://schemas.openxmlformats.org/presentationml/2006/main">
-  <p:cSld>
-    <p:spTree>
-      <p:nvGrpSpPr>
-        <p:cNvPr id="1" name=""/>
-        <p:cNvGrpSpPr/>
-        <p:nvPr/>
-      </p:nvGrpSpPr>
-      <p:grpSpPr>
-        <a:xfrm>
-          <a:off x="0" y="0"/>
-          <a:ext cx="0" cy="0"/>
-          <a:chOff x="0" y="0"/>
-          <a:chExt cx="0" cy="0"/>
-        </a:xfrm>
-      </p:grpSpPr>
-      <p:sp>
-        <p:nvSpPr>
-          <p:cNvPr id="2" name="Title 1"/>
-          <p:cNvSpPr>
-            <a:spLocks noGrp="1"/>
-          </p:cNvSpPr>
-          <p:nvPr>
-            <p:ph type="title"/>
-          </p:nvPr>
-        </p:nvSpPr>
-        <p:spPr/>
-        <p:txBody>
-          <a:bodyPr/>
-          <a:lstStyle/>
-          <a:p>
-            <a:pPr lvl="0" marL="0" indent="0">
-              <a:buNone/>
-            </a:pPr>
-            <a:r>
-              <a:rPr/>
               <a:t>Restructuring</a:t>
             </a:r>
           </a:p>
@@ -5740,19 +5333,19 @@
                 <a:latin typeface="Courier"/>
               </a:rPr>
               <a:t>##    id depression_score time
-## 1   1                2    0
-## 2   1                4    3
-## 3   1                5    9
-## 4   1                6   12
-## 5   1                8    6
+## 1   1                4    9
+## 2   1                6    0
+## 3   1                6   12
+## 4   1                8    6
+## 5   1               10    3
 ## 6   2                2    0
 ## 7   2                4    3
 ## 8   2                5    9
 ## 9   2                6   12
 ## 10  2                8    6
 ## 11  3                2    0
-## 12  3                8    9
-## 13  3                8   12</a:t>
+## 12  3                4    3
+## 13  3                5    9</a:t>
             </a:r>
           </a:p>
         </p:txBody>

</xml_diff>